<commit_message>
fixed tasmanian without intersections first
</commit_message>
<xml_diff>
--- a/tasmanian/manuscript_figures.pptx
+++ b/tasmanian/manuscript_figures.pptx
@@ -6,8 +6,11 @@
   </p:sldMasterIdLst>
   <p:sldIdLst>
     <p:sldId id="259" r:id="rId2"/>
-    <p:sldId id="257" r:id="rId3"/>
-    <p:sldId id="258" r:id="rId4"/>
+    <p:sldId id="260" r:id="rId3"/>
+    <p:sldId id="262" r:id="rId4"/>
+    <p:sldId id="261" r:id="rId5"/>
+    <p:sldId id="257" r:id="rId6"/>
+    <p:sldId id="258" r:id="rId7"/>
   </p:sldIdLst>
   <p:sldSz cx="8229600" cy="11887200"/>
   <p:notesSz cx="6858000" cy="9144000"/>
@@ -12144,7 +12147,7 @@
           <a:p>
             <a:fld id="{3D88238A-9EF6-F041-A357-80982672EF68}" type="datetimeFigureOut">
               <a:rPr lang="en-US" smtClean="0"/>
-              <a:t>1/24/20</a:t>
+              <a:t>3/4/20</a:t>
             </a:fld>
             <a:endParaRPr lang="en-US"/>
           </a:p>
@@ -12314,7 +12317,7 @@
           <a:p>
             <a:fld id="{3D88238A-9EF6-F041-A357-80982672EF68}" type="datetimeFigureOut">
               <a:rPr lang="en-US" smtClean="0"/>
-              <a:t>1/24/20</a:t>
+              <a:t>3/4/20</a:t>
             </a:fld>
             <a:endParaRPr lang="en-US"/>
           </a:p>
@@ -12494,7 +12497,7 @@
           <a:p>
             <a:fld id="{3D88238A-9EF6-F041-A357-80982672EF68}" type="datetimeFigureOut">
               <a:rPr lang="en-US" smtClean="0"/>
-              <a:t>1/24/20</a:t>
+              <a:t>3/4/20</a:t>
             </a:fld>
             <a:endParaRPr lang="en-US"/>
           </a:p>
@@ -12664,7 +12667,7 @@
           <a:p>
             <a:fld id="{3D88238A-9EF6-F041-A357-80982672EF68}" type="datetimeFigureOut">
               <a:rPr lang="en-US" smtClean="0"/>
-              <a:t>1/24/20</a:t>
+              <a:t>3/4/20</a:t>
             </a:fld>
             <a:endParaRPr lang="en-US"/>
           </a:p>
@@ -12908,7 +12911,7 @@
           <a:p>
             <a:fld id="{3D88238A-9EF6-F041-A357-80982672EF68}" type="datetimeFigureOut">
               <a:rPr lang="en-US" smtClean="0"/>
-              <a:t>1/24/20</a:t>
+              <a:t>3/4/20</a:t>
             </a:fld>
             <a:endParaRPr lang="en-US"/>
           </a:p>
@@ -13140,7 +13143,7 @@
           <a:p>
             <a:fld id="{3D88238A-9EF6-F041-A357-80982672EF68}" type="datetimeFigureOut">
               <a:rPr lang="en-US" smtClean="0"/>
-              <a:t>1/24/20</a:t>
+              <a:t>3/4/20</a:t>
             </a:fld>
             <a:endParaRPr lang="en-US"/>
           </a:p>
@@ -13507,7 +13510,7 @@
           <a:p>
             <a:fld id="{3D88238A-9EF6-F041-A357-80982672EF68}" type="datetimeFigureOut">
               <a:rPr lang="en-US" smtClean="0"/>
-              <a:t>1/24/20</a:t>
+              <a:t>3/4/20</a:t>
             </a:fld>
             <a:endParaRPr lang="en-US"/>
           </a:p>
@@ -13625,7 +13628,7 @@
           <a:p>
             <a:fld id="{3D88238A-9EF6-F041-A357-80982672EF68}" type="datetimeFigureOut">
               <a:rPr lang="en-US" smtClean="0"/>
-              <a:t>1/24/20</a:t>
+              <a:t>3/4/20</a:t>
             </a:fld>
             <a:endParaRPr lang="en-US"/>
           </a:p>
@@ -13720,7 +13723,7 @@
           <a:p>
             <a:fld id="{3D88238A-9EF6-F041-A357-80982672EF68}" type="datetimeFigureOut">
               <a:rPr lang="en-US" smtClean="0"/>
-              <a:t>1/24/20</a:t>
+              <a:t>3/4/20</a:t>
             </a:fld>
             <a:endParaRPr lang="en-US"/>
           </a:p>
@@ -13997,7 +14000,7 @@
           <a:p>
             <a:fld id="{3D88238A-9EF6-F041-A357-80982672EF68}" type="datetimeFigureOut">
               <a:rPr lang="en-US" smtClean="0"/>
-              <a:t>1/24/20</a:t>
+              <a:t>3/4/20</a:t>
             </a:fld>
             <a:endParaRPr lang="en-US"/>
           </a:p>
@@ -14254,7 +14257,7 @@
           <a:p>
             <a:fld id="{3D88238A-9EF6-F041-A357-80982672EF68}" type="datetimeFigureOut">
               <a:rPr lang="en-US" smtClean="0"/>
-              <a:t>1/24/20</a:t>
+              <a:t>3/4/20</a:t>
             </a:fld>
             <a:endParaRPr lang="en-US"/>
           </a:p>
@@ -14467,7 +14470,7 @@
           <a:p>
             <a:fld id="{3D88238A-9EF6-F041-A357-80982672EF68}" type="datetimeFigureOut">
               <a:rPr lang="en-US" smtClean="0"/>
-              <a:t>1/24/20</a:t>
+              <a:t>3/4/20</a:t>
             </a:fld>
             <a:endParaRPr lang="en-US"/>
           </a:p>
@@ -18671,7 +18674,7 @@
           <p:nvPr>
             <p:extLst>
               <p:ext uri="{D42A27DB-BD31-4B8C-83A1-F6EECF244321}">
-                <p14:modId xmlns:p14="http://schemas.microsoft.com/office/powerpoint/2010/main" val="1428085216"/>
+                <p14:modId xmlns:p14="http://schemas.microsoft.com/office/powerpoint/2010/main" val="3635448865"/>
               </p:ext>
             </p:extLst>
           </p:nvPr>
@@ -18948,7 +18951,7 @@
           <p:nvPr>
             <p:extLst>
               <p:ext uri="{D42A27DB-BD31-4B8C-83A1-F6EECF244321}">
-                <p14:modId xmlns:p14="http://schemas.microsoft.com/office/powerpoint/2010/main" val="2271670408"/>
+                <p14:modId xmlns:p14="http://schemas.microsoft.com/office/powerpoint/2010/main" val="2791545539"/>
               </p:ext>
             </p:extLst>
           </p:nvPr>
@@ -18976,7 +18979,7 @@
           <p:nvPr>
             <p:extLst>
               <p:ext uri="{D42A27DB-BD31-4B8C-83A1-F6EECF244321}">
-                <p14:modId xmlns:p14="http://schemas.microsoft.com/office/powerpoint/2010/main" val="1401636292"/>
+                <p14:modId xmlns:p14="http://schemas.microsoft.com/office/powerpoint/2010/main" val="2623041831"/>
               </p:ext>
             </p:extLst>
           </p:nvPr>
@@ -19045,6 +19048,1285 @@
 </file>
 
 <file path=ppt/slides/slide2.xml><?xml version="1.0" encoding="utf-8"?>
+<p:sld xmlns:a="http://schemas.openxmlformats.org/drawingml/2006/main" xmlns:r="http://schemas.openxmlformats.org/officeDocument/2006/relationships" xmlns:p="http://schemas.openxmlformats.org/presentationml/2006/main">
+  <p:cSld>
+    <p:spTree>
+      <p:nvGrpSpPr>
+        <p:cNvPr id="1" name=""/>
+        <p:cNvGrpSpPr/>
+        <p:nvPr/>
+      </p:nvGrpSpPr>
+      <p:grpSpPr>
+        <a:xfrm>
+          <a:off x="0" y="0"/>
+          <a:ext cx="0" cy="0"/>
+          <a:chOff x="0" y="0"/>
+          <a:chExt cx="0" cy="0"/>
+        </a:xfrm>
+      </p:grpSpPr>
+      <p:sp>
+        <p:nvSpPr>
+          <p:cNvPr id="2" name="TextBox 1">
+            <a:extLst>
+              <a:ext uri="{FF2B5EF4-FFF2-40B4-BE49-F238E27FC236}">
+                <a16:creationId xmlns:a16="http://schemas.microsoft.com/office/drawing/2014/main" id="{A0174424-9580-7A42-98D7-4E619EB8359B}"/>
+              </a:ext>
+            </a:extLst>
+          </p:cNvPr>
+          <p:cNvSpPr txBox="1"/>
+          <p:nvPr/>
+        </p:nvSpPr>
+        <p:spPr>
+          <a:xfrm>
+            <a:off x="2845324" y="81030"/>
+            <a:ext cx="2386551" cy="630942"/>
+          </a:xfrm>
+          <a:prstGeom prst="rect">
+            <a:avLst/>
+          </a:prstGeom>
+          <a:noFill/>
+        </p:spPr>
+        <p:txBody>
+          <a:bodyPr wrap="none" rtlCol="0">
+            <a:spAutoFit/>
+          </a:bodyPr>
+          <a:lstStyle/>
+          <a:p>
+            <a:r>
+              <a:rPr lang="en-US" sz="3500" dirty="0"/>
+              <a:t>Junction tag</a:t>
+            </a:r>
+          </a:p>
+        </p:txBody>
+      </p:sp>
+      <p:sp>
+        <p:nvSpPr>
+          <p:cNvPr id="4" name="TextBox 3">
+            <a:extLst>
+              <a:ext uri="{FF2B5EF4-FFF2-40B4-BE49-F238E27FC236}">
+                <a16:creationId xmlns:a16="http://schemas.microsoft.com/office/drawing/2014/main" id="{835E6555-A7B0-554E-A5BE-F3A419DC9915}"/>
+              </a:ext>
+            </a:extLst>
+          </p:cNvPr>
+          <p:cNvSpPr txBox="1"/>
+          <p:nvPr/>
+        </p:nvSpPr>
+        <p:spPr>
+          <a:xfrm>
+            <a:off x="0" y="1049867"/>
+            <a:ext cx="8288867" cy="861774"/>
+          </a:xfrm>
+          <a:prstGeom prst="rect">
+            <a:avLst/>
+          </a:prstGeom>
+          <a:noFill/>
+        </p:spPr>
+        <p:txBody>
+          <a:bodyPr wrap="square" rtlCol="0">
+            <a:spAutoFit/>
+          </a:bodyPr>
+          <a:lstStyle/>
+          <a:p>
+            <a:r>
+              <a:rPr lang="en-US" sz="2500" dirty="0"/>
+              <a:t>AS:i:76 XS:i:76 RG:Z:TCCATTGC </a:t>
+            </a:r>
+            <a:r>
+              <a:rPr lang="en-US" sz="2500" b="1" dirty="0"/>
+              <a:t>tm:Z:0.76;10001.10469 </a:t>
+            </a:r>
+            <a:r>
+              <a:rPr lang="en-US" sz="2500" dirty="0"/>
+              <a:t>tc:i:0</a:t>
+            </a:r>
+          </a:p>
+          <a:p>
+            <a:endParaRPr lang="en-US" sz="2500" dirty="0"/>
+          </a:p>
+        </p:txBody>
+      </p:sp>
+      <p:sp>
+        <p:nvSpPr>
+          <p:cNvPr id="5" name="Rectangle 4">
+            <a:extLst>
+              <a:ext uri="{FF2B5EF4-FFF2-40B4-BE49-F238E27FC236}">
+                <a16:creationId xmlns:a16="http://schemas.microsoft.com/office/drawing/2014/main" id="{8C081E26-56B9-2245-A05D-09A617B48905}"/>
+              </a:ext>
+            </a:extLst>
+          </p:cNvPr>
+          <p:cNvSpPr/>
+          <p:nvPr/>
+        </p:nvSpPr>
+        <p:spPr>
+          <a:xfrm>
+            <a:off x="33868" y="2658533"/>
+            <a:ext cx="8195731" cy="270934"/>
+          </a:xfrm>
+          <a:prstGeom prst="rect">
+            <a:avLst/>
+          </a:prstGeom>
+        </p:spPr>
+        <p:style>
+          <a:lnRef idx="2">
+            <a:schemeClr val="accent1">
+              <a:shade val="50000"/>
+            </a:schemeClr>
+          </a:lnRef>
+          <a:fillRef idx="1">
+            <a:schemeClr val="accent1"/>
+          </a:fillRef>
+          <a:effectRef idx="0">
+            <a:schemeClr val="accent1"/>
+          </a:effectRef>
+          <a:fontRef idx="minor">
+            <a:schemeClr val="lt1"/>
+          </a:fontRef>
+        </p:style>
+        <p:txBody>
+          <a:bodyPr rtlCol="0" anchor="ctr"/>
+          <a:lstStyle/>
+          <a:p>
+            <a:pPr algn="ctr"/>
+            <a:r>
+              <a:rPr lang="en-US" dirty="0"/>
+              <a:t>Genome</a:t>
+            </a:r>
+          </a:p>
+        </p:txBody>
+      </p:sp>
+      <p:sp>
+        <p:nvSpPr>
+          <p:cNvPr id="6" name="Rectangle 5">
+            <a:extLst>
+              <a:ext uri="{FF2B5EF4-FFF2-40B4-BE49-F238E27FC236}">
+                <a16:creationId xmlns:a16="http://schemas.microsoft.com/office/drawing/2014/main" id="{51BEE72B-E8B0-E644-BB8C-9F79B16AFECB}"/>
+              </a:ext>
+            </a:extLst>
+          </p:cNvPr>
+          <p:cNvSpPr/>
+          <p:nvPr/>
+        </p:nvSpPr>
+        <p:spPr>
+          <a:xfrm>
+            <a:off x="5283200" y="2658533"/>
+            <a:ext cx="2404534" cy="270934"/>
+          </a:xfrm>
+          <a:prstGeom prst="rect">
+            <a:avLst/>
+          </a:prstGeom>
+          <a:solidFill>
+            <a:schemeClr val="accent2"/>
+          </a:solidFill>
+        </p:spPr>
+        <p:style>
+          <a:lnRef idx="2">
+            <a:schemeClr val="accent1">
+              <a:shade val="50000"/>
+            </a:schemeClr>
+          </a:lnRef>
+          <a:fillRef idx="1">
+            <a:schemeClr val="accent1"/>
+          </a:fillRef>
+          <a:effectRef idx="0">
+            <a:schemeClr val="accent1"/>
+          </a:effectRef>
+          <a:fontRef idx="minor">
+            <a:schemeClr val="lt1"/>
+          </a:fontRef>
+        </p:style>
+        <p:txBody>
+          <a:bodyPr rtlCol="0" anchor="ctr"/>
+          <a:lstStyle/>
+          <a:p>
+            <a:pPr algn="ctr"/>
+            <a:r>
+              <a:rPr lang="en-US" dirty="0"/>
+              <a:t>Bed fragment</a:t>
+            </a:r>
+          </a:p>
+        </p:txBody>
+      </p:sp>
+      <p:sp>
+        <p:nvSpPr>
+          <p:cNvPr id="7" name="Rectangle 6">
+            <a:extLst>
+              <a:ext uri="{FF2B5EF4-FFF2-40B4-BE49-F238E27FC236}">
+                <a16:creationId xmlns:a16="http://schemas.microsoft.com/office/drawing/2014/main" id="{8807F011-BBBE-C04D-B540-96E24421CCCD}"/>
+              </a:ext>
+            </a:extLst>
+          </p:cNvPr>
+          <p:cNvSpPr/>
+          <p:nvPr/>
+        </p:nvSpPr>
+        <p:spPr>
+          <a:xfrm>
+            <a:off x="5554134" y="2304309"/>
+            <a:ext cx="1066800" cy="188092"/>
+          </a:xfrm>
+          <a:prstGeom prst="rect">
+            <a:avLst/>
+          </a:prstGeom>
+          <a:solidFill>
+            <a:schemeClr val="accent6"/>
+          </a:solidFill>
+        </p:spPr>
+        <p:style>
+          <a:lnRef idx="2">
+            <a:schemeClr val="accent1">
+              <a:shade val="50000"/>
+            </a:schemeClr>
+          </a:lnRef>
+          <a:fillRef idx="1">
+            <a:schemeClr val="accent1"/>
+          </a:fillRef>
+          <a:effectRef idx="0">
+            <a:schemeClr val="accent1"/>
+          </a:effectRef>
+          <a:fontRef idx="minor">
+            <a:schemeClr val="lt1"/>
+          </a:fontRef>
+        </p:style>
+        <p:txBody>
+          <a:bodyPr rtlCol="0" anchor="ctr"/>
+          <a:lstStyle/>
+          <a:p>
+            <a:pPr algn="ctr"/>
+            <a:r>
+              <a:rPr lang="en-US" dirty="0"/>
+              <a:t>read</a:t>
+            </a:r>
+          </a:p>
+        </p:txBody>
+      </p:sp>
+      <p:cxnSp>
+        <p:nvCxnSpPr>
+          <p:cNvPr id="9" name="Straight Arrow Connector 8">
+            <a:extLst>
+              <a:ext uri="{FF2B5EF4-FFF2-40B4-BE49-F238E27FC236}">
+                <a16:creationId xmlns:a16="http://schemas.microsoft.com/office/drawing/2014/main" id="{98D3FB07-A5B7-4D4E-9D35-8FC4ADEC117D}"/>
+              </a:ext>
+            </a:extLst>
+          </p:cNvPr>
+          <p:cNvCxnSpPr/>
+          <p:nvPr/>
+        </p:nvCxnSpPr>
+        <p:spPr>
+          <a:xfrm>
+            <a:off x="4876800" y="1439333"/>
+            <a:ext cx="677334" cy="864976"/>
+          </a:xfrm>
+          <a:prstGeom prst="straightConnector1">
+            <a:avLst/>
+          </a:prstGeom>
+          <a:ln>
+            <a:solidFill>
+              <a:schemeClr val="accent6"/>
+            </a:solidFill>
+            <a:tailEnd type="triangle"/>
+          </a:ln>
+        </p:spPr>
+        <p:style>
+          <a:lnRef idx="1">
+            <a:schemeClr val="accent1"/>
+          </a:lnRef>
+          <a:fillRef idx="0">
+            <a:schemeClr val="accent1"/>
+          </a:fillRef>
+          <a:effectRef idx="0">
+            <a:schemeClr val="accent1"/>
+          </a:effectRef>
+          <a:fontRef idx="minor">
+            <a:schemeClr val="tx1"/>
+          </a:fontRef>
+        </p:style>
+      </p:cxnSp>
+      <p:cxnSp>
+        <p:nvCxnSpPr>
+          <p:cNvPr id="10" name="Straight Arrow Connector 9">
+            <a:extLst>
+              <a:ext uri="{FF2B5EF4-FFF2-40B4-BE49-F238E27FC236}">
+                <a16:creationId xmlns:a16="http://schemas.microsoft.com/office/drawing/2014/main" id="{A4AC44CD-4E25-CC49-B04D-99265601A746}"/>
+              </a:ext>
+            </a:extLst>
+          </p:cNvPr>
+          <p:cNvCxnSpPr>
+            <a:cxnSpLocks/>
+          </p:cNvCxnSpPr>
+          <p:nvPr/>
+        </p:nvCxnSpPr>
+        <p:spPr>
+          <a:xfrm>
+            <a:off x="5181600" y="1400889"/>
+            <a:ext cx="1401233" cy="836136"/>
+          </a:xfrm>
+          <a:prstGeom prst="straightConnector1">
+            <a:avLst/>
+          </a:prstGeom>
+          <a:ln>
+            <a:solidFill>
+              <a:schemeClr val="accent6"/>
+            </a:solidFill>
+            <a:tailEnd type="triangle"/>
+          </a:ln>
+        </p:spPr>
+        <p:style>
+          <a:lnRef idx="1">
+            <a:schemeClr val="accent1"/>
+          </a:lnRef>
+          <a:fillRef idx="0">
+            <a:schemeClr val="accent1"/>
+          </a:fillRef>
+          <a:effectRef idx="0">
+            <a:schemeClr val="accent1"/>
+          </a:effectRef>
+          <a:fontRef idx="minor">
+            <a:schemeClr val="tx1"/>
+          </a:fontRef>
+        </p:style>
+      </p:cxnSp>
+      <p:cxnSp>
+        <p:nvCxnSpPr>
+          <p:cNvPr id="12" name="Straight Arrow Connector 11">
+            <a:extLst>
+              <a:ext uri="{FF2B5EF4-FFF2-40B4-BE49-F238E27FC236}">
+                <a16:creationId xmlns:a16="http://schemas.microsoft.com/office/drawing/2014/main" id="{1EF306DC-1B81-3E49-835C-B07D7EBF5FEC}"/>
+              </a:ext>
+            </a:extLst>
+          </p:cNvPr>
+          <p:cNvCxnSpPr>
+            <a:cxnSpLocks/>
+          </p:cNvCxnSpPr>
+          <p:nvPr/>
+        </p:nvCxnSpPr>
+        <p:spPr>
+          <a:xfrm flipH="1">
+            <a:off x="5283200" y="1512795"/>
+            <a:ext cx="501650" cy="1075252"/>
+          </a:xfrm>
+          <a:prstGeom prst="straightConnector1">
+            <a:avLst/>
+          </a:prstGeom>
+          <a:ln>
+            <a:solidFill>
+              <a:schemeClr val="accent2"/>
+            </a:solidFill>
+            <a:tailEnd type="triangle"/>
+          </a:ln>
+        </p:spPr>
+        <p:style>
+          <a:lnRef idx="1">
+            <a:schemeClr val="accent1"/>
+          </a:lnRef>
+          <a:fillRef idx="0">
+            <a:schemeClr val="accent1"/>
+          </a:fillRef>
+          <a:effectRef idx="0">
+            <a:schemeClr val="accent1"/>
+          </a:effectRef>
+          <a:fontRef idx="minor">
+            <a:schemeClr val="tx1"/>
+          </a:fontRef>
+        </p:style>
+      </p:cxnSp>
+      <p:cxnSp>
+        <p:nvCxnSpPr>
+          <p:cNvPr id="14" name="Straight Arrow Connector 13">
+            <a:extLst>
+              <a:ext uri="{FF2B5EF4-FFF2-40B4-BE49-F238E27FC236}">
+                <a16:creationId xmlns:a16="http://schemas.microsoft.com/office/drawing/2014/main" id="{876B0BD5-6AB6-684F-9555-ACB080C55983}"/>
+              </a:ext>
+            </a:extLst>
+          </p:cNvPr>
+          <p:cNvCxnSpPr>
+            <a:cxnSpLocks/>
+          </p:cNvCxnSpPr>
+          <p:nvPr/>
+        </p:nvCxnSpPr>
+        <p:spPr>
+          <a:xfrm>
+            <a:off x="6684433" y="1444501"/>
+            <a:ext cx="850900" cy="1143546"/>
+          </a:xfrm>
+          <a:prstGeom prst="straightConnector1">
+            <a:avLst/>
+          </a:prstGeom>
+          <a:ln>
+            <a:solidFill>
+              <a:schemeClr val="accent2"/>
+            </a:solidFill>
+            <a:tailEnd type="triangle"/>
+          </a:ln>
+        </p:spPr>
+        <p:style>
+          <a:lnRef idx="1">
+            <a:schemeClr val="accent1"/>
+          </a:lnRef>
+          <a:fillRef idx="0">
+            <a:schemeClr val="accent1"/>
+          </a:fillRef>
+          <a:effectRef idx="0">
+            <a:schemeClr val="accent1"/>
+          </a:effectRef>
+          <a:fontRef idx="minor">
+            <a:schemeClr val="tx1"/>
+          </a:fontRef>
+        </p:style>
+      </p:cxnSp>
+      <p:sp>
+        <p:nvSpPr>
+          <p:cNvPr id="16" name="TextBox 15">
+            <a:extLst>
+              <a:ext uri="{FF2B5EF4-FFF2-40B4-BE49-F238E27FC236}">
+                <a16:creationId xmlns:a16="http://schemas.microsoft.com/office/drawing/2014/main" id="{482715D4-E5DB-4640-A597-4E03E8445C16}"/>
+              </a:ext>
+            </a:extLst>
+          </p:cNvPr>
+          <p:cNvSpPr txBox="1"/>
+          <p:nvPr/>
+        </p:nvSpPr>
+        <p:spPr>
+          <a:xfrm>
+            <a:off x="2456532" y="7200037"/>
+            <a:ext cx="3164136" cy="630942"/>
+          </a:xfrm>
+          <a:prstGeom prst="rect">
+            <a:avLst/>
+          </a:prstGeom>
+          <a:noFill/>
+        </p:spPr>
+        <p:txBody>
+          <a:bodyPr wrap="none" rtlCol="0">
+            <a:spAutoFit/>
+          </a:bodyPr>
+          <a:lstStyle/>
+          <a:p>
+            <a:r>
+              <a:rPr lang="en-US" sz="3500" dirty="0"/>
+              <a:t>complement tag</a:t>
+            </a:r>
+          </a:p>
+        </p:txBody>
+      </p:sp>
+      <p:sp>
+        <p:nvSpPr>
+          <p:cNvPr id="17" name="TextBox 16">
+            <a:extLst>
+              <a:ext uri="{FF2B5EF4-FFF2-40B4-BE49-F238E27FC236}">
+                <a16:creationId xmlns:a16="http://schemas.microsoft.com/office/drawing/2014/main" id="{6D01D281-A834-AB47-A202-F374A7756504}"/>
+              </a:ext>
+            </a:extLst>
+          </p:cNvPr>
+          <p:cNvSpPr txBox="1"/>
+          <p:nvPr/>
+        </p:nvSpPr>
+        <p:spPr>
+          <a:xfrm>
+            <a:off x="-16933" y="8214632"/>
+            <a:ext cx="8246533" cy="477054"/>
+          </a:xfrm>
+          <a:prstGeom prst="rect">
+            <a:avLst/>
+          </a:prstGeom>
+          <a:noFill/>
+        </p:spPr>
+        <p:txBody>
+          <a:bodyPr wrap="square" rtlCol="0">
+            <a:spAutoFit/>
+          </a:bodyPr>
+          <a:lstStyle/>
+          <a:p>
+            <a:r>
+              <a:rPr lang="en-US" sz="2400" dirty="0"/>
+              <a:t>AS:i:76 XS:i:76 RG:Z:TCCATTGC tm:Z:43.76;366592.366674 </a:t>
+            </a:r>
+            <a:r>
+              <a:rPr lang="en-US" sz="2400" b="1" dirty="0"/>
+              <a:t>tc:i:75</a:t>
+            </a:r>
+          </a:p>
+        </p:txBody>
+      </p:sp>
+      <p:sp>
+        <p:nvSpPr>
+          <p:cNvPr id="18" name="Rectangle 17">
+            <a:extLst>
+              <a:ext uri="{FF2B5EF4-FFF2-40B4-BE49-F238E27FC236}">
+                <a16:creationId xmlns:a16="http://schemas.microsoft.com/office/drawing/2014/main" id="{A39D539A-8ADC-7C4B-83D0-DB891AFB78B6}"/>
+              </a:ext>
+            </a:extLst>
+          </p:cNvPr>
+          <p:cNvSpPr/>
+          <p:nvPr/>
+        </p:nvSpPr>
+        <p:spPr>
+          <a:xfrm>
+            <a:off x="16934" y="9793869"/>
+            <a:ext cx="8195731" cy="270934"/>
+          </a:xfrm>
+          <a:prstGeom prst="rect">
+            <a:avLst/>
+          </a:prstGeom>
+        </p:spPr>
+        <p:style>
+          <a:lnRef idx="2">
+            <a:schemeClr val="accent1">
+              <a:shade val="50000"/>
+            </a:schemeClr>
+          </a:lnRef>
+          <a:fillRef idx="1">
+            <a:schemeClr val="accent1"/>
+          </a:fillRef>
+          <a:effectRef idx="0">
+            <a:schemeClr val="accent1"/>
+          </a:effectRef>
+          <a:fontRef idx="minor">
+            <a:schemeClr val="lt1"/>
+          </a:fontRef>
+        </p:style>
+        <p:txBody>
+          <a:bodyPr rtlCol="0" anchor="ctr"/>
+          <a:lstStyle/>
+          <a:p>
+            <a:pPr algn="ctr"/>
+            <a:r>
+              <a:rPr lang="en-US" dirty="0"/>
+              <a:t>Genome</a:t>
+            </a:r>
+          </a:p>
+        </p:txBody>
+      </p:sp>
+      <p:sp>
+        <p:nvSpPr>
+          <p:cNvPr id="19" name="Rectangle 18">
+            <a:extLst>
+              <a:ext uri="{FF2B5EF4-FFF2-40B4-BE49-F238E27FC236}">
+                <a16:creationId xmlns:a16="http://schemas.microsoft.com/office/drawing/2014/main" id="{E5A34B06-41FD-1043-AD68-F76442FC554B}"/>
+              </a:ext>
+            </a:extLst>
+          </p:cNvPr>
+          <p:cNvSpPr/>
+          <p:nvPr/>
+        </p:nvSpPr>
+        <p:spPr>
+          <a:xfrm>
+            <a:off x="5266266" y="9793869"/>
+            <a:ext cx="2404534" cy="270934"/>
+          </a:xfrm>
+          <a:prstGeom prst="rect">
+            <a:avLst/>
+          </a:prstGeom>
+          <a:solidFill>
+            <a:schemeClr val="accent2"/>
+          </a:solidFill>
+        </p:spPr>
+        <p:style>
+          <a:lnRef idx="2">
+            <a:schemeClr val="accent1">
+              <a:shade val="50000"/>
+            </a:schemeClr>
+          </a:lnRef>
+          <a:fillRef idx="1">
+            <a:schemeClr val="accent1"/>
+          </a:fillRef>
+          <a:effectRef idx="0">
+            <a:schemeClr val="accent1"/>
+          </a:effectRef>
+          <a:fontRef idx="minor">
+            <a:schemeClr val="lt1"/>
+          </a:fontRef>
+        </p:style>
+        <p:txBody>
+          <a:bodyPr rtlCol="0" anchor="ctr"/>
+          <a:lstStyle/>
+          <a:p>
+            <a:pPr algn="ctr"/>
+            <a:r>
+              <a:rPr lang="en-US" dirty="0"/>
+              <a:t>Bed fragment</a:t>
+            </a:r>
+          </a:p>
+        </p:txBody>
+      </p:sp>
+      <p:sp>
+        <p:nvSpPr>
+          <p:cNvPr id="20" name="Rectangle 19">
+            <a:extLst>
+              <a:ext uri="{FF2B5EF4-FFF2-40B4-BE49-F238E27FC236}">
+                <a16:creationId xmlns:a16="http://schemas.microsoft.com/office/drawing/2014/main" id="{FD73FF55-04ED-5846-BF77-A4E5E84783D0}"/>
+              </a:ext>
+            </a:extLst>
+          </p:cNvPr>
+          <p:cNvSpPr/>
+          <p:nvPr/>
+        </p:nvSpPr>
+        <p:spPr>
+          <a:xfrm>
+            <a:off x="5283200" y="9441021"/>
+            <a:ext cx="152400" cy="186716"/>
+          </a:xfrm>
+          <a:prstGeom prst="rect">
+            <a:avLst/>
+          </a:prstGeom>
+          <a:solidFill>
+            <a:schemeClr val="accent2">
+              <a:lumMod val="60000"/>
+              <a:lumOff val="40000"/>
+            </a:schemeClr>
+          </a:solidFill>
+        </p:spPr>
+        <p:style>
+          <a:lnRef idx="2">
+            <a:schemeClr val="accent1">
+              <a:shade val="50000"/>
+            </a:schemeClr>
+          </a:lnRef>
+          <a:fillRef idx="1">
+            <a:schemeClr val="accent1"/>
+          </a:fillRef>
+          <a:effectRef idx="0">
+            <a:schemeClr val="accent1"/>
+          </a:effectRef>
+          <a:fontRef idx="minor">
+            <a:schemeClr val="lt1"/>
+          </a:fontRef>
+        </p:style>
+        <p:txBody>
+          <a:bodyPr rtlCol="0" anchor="ctr"/>
+          <a:lstStyle/>
+          <a:p>
+            <a:pPr algn="ctr"/>
+            <a:endParaRPr lang="en-US" dirty="0"/>
+          </a:p>
+        </p:txBody>
+      </p:sp>
+      <p:sp>
+        <p:nvSpPr>
+          <p:cNvPr id="25" name="Rectangle 24">
+            <a:extLst>
+              <a:ext uri="{FF2B5EF4-FFF2-40B4-BE49-F238E27FC236}">
+                <a16:creationId xmlns:a16="http://schemas.microsoft.com/office/drawing/2014/main" id="{2C1FE34A-DA53-404F-8CB9-D17398B1F23D}"/>
+              </a:ext>
+            </a:extLst>
+          </p:cNvPr>
+          <p:cNvSpPr/>
+          <p:nvPr/>
+        </p:nvSpPr>
+        <p:spPr>
+          <a:xfrm>
+            <a:off x="3522133" y="9456578"/>
+            <a:ext cx="1744133" cy="186716"/>
+          </a:xfrm>
+          <a:prstGeom prst="rect">
+            <a:avLst/>
+          </a:prstGeom>
+          <a:solidFill>
+            <a:schemeClr val="accent6"/>
+          </a:solidFill>
+        </p:spPr>
+        <p:style>
+          <a:lnRef idx="2">
+            <a:schemeClr val="accent1">
+              <a:shade val="50000"/>
+            </a:schemeClr>
+          </a:lnRef>
+          <a:fillRef idx="1">
+            <a:schemeClr val="accent1"/>
+          </a:fillRef>
+          <a:effectRef idx="0">
+            <a:schemeClr val="accent1"/>
+          </a:effectRef>
+          <a:fontRef idx="minor">
+            <a:schemeClr val="lt1"/>
+          </a:fontRef>
+        </p:style>
+        <p:txBody>
+          <a:bodyPr rtlCol="0" anchor="ctr"/>
+          <a:lstStyle/>
+          <a:p>
+            <a:pPr algn="ctr"/>
+            <a:r>
+              <a:rPr lang="en-US" dirty="0"/>
+              <a:t>read</a:t>
+            </a:r>
+          </a:p>
+        </p:txBody>
+      </p:sp>
+      <p:cxnSp>
+        <p:nvCxnSpPr>
+          <p:cNvPr id="26" name="Straight Arrow Connector 25">
+            <a:extLst>
+              <a:ext uri="{FF2B5EF4-FFF2-40B4-BE49-F238E27FC236}">
+                <a16:creationId xmlns:a16="http://schemas.microsoft.com/office/drawing/2014/main" id="{B5BE8D7E-5334-854F-9780-3BB928CFE857}"/>
+              </a:ext>
+            </a:extLst>
+          </p:cNvPr>
+          <p:cNvCxnSpPr>
+            <a:cxnSpLocks/>
+          </p:cNvCxnSpPr>
+          <p:nvPr/>
+        </p:nvCxnSpPr>
+        <p:spPr>
+          <a:xfrm flipH="1">
+            <a:off x="4705351" y="9306916"/>
+            <a:ext cx="2404532" cy="65445"/>
+          </a:xfrm>
+          <a:prstGeom prst="straightConnector1">
+            <a:avLst/>
+          </a:prstGeom>
+          <a:ln>
+            <a:solidFill>
+              <a:schemeClr val="accent6"/>
+            </a:solidFill>
+            <a:tailEnd type="triangle"/>
+          </a:ln>
+        </p:spPr>
+        <p:style>
+          <a:lnRef idx="1">
+            <a:schemeClr val="accent1"/>
+          </a:lnRef>
+          <a:fillRef idx="0">
+            <a:schemeClr val="accent1"/>
+          </a:fillRef>
+          <a:effectRef idx="0">
+            <a:schemeClr val="accent1"/>
+          </a:effectRef>
+          <a:fontRef idx="minor">
+            <a:schemeClr val="tx1"/>
+          </a:fontRef>
+        </p:style>
+      </p:cxnSp>
+      <p:sp>
+        <p:nvSpPr>
+          <p:cNvPr id="28" name="Rectangle 27">
+            <a:extLst>
+              <a:ext uri="{FF2B5EF4-FFF2-40B4-BE49-F238E27FC236}">
+                <a16:creationId xmlns:a16="http://schemas.microsoft.com/office/drawing/2014/main" id="{704B9E0A-F3D0-864E-985C-35F68E448AF1}"/>
+              </a:ext>
+            </a:extLst>
+          </p:cNvPr>
+          <p:cNvSpPr/>
+          <p:nvPr/>
+        </p:nvSpPr>
+        <p:spPr>
+          <a:xfrm>
+            <a:off x="6468533" y="10299595"/>
+            <a:ext cx="1219201" cy="186716"/>
+          </a:xfrm>
+          <a:prstGeom prst="rect">
+            <a:avLst/>
+          </a:prstGeom>
+          <a:solidFill>
+            <a:schemeClr val="accent2">
+              <a:lumMod val="60000"/>
+              <a:lumOff val="40000"/>
+            </a:schemeClr>
+          </a:solidFill>
+        </p:spPr>
+        <p:style>
+          <a:lnRef idx="2">
+            <a:schemeClr val="accent1">
+              <a:shade val="50000"/>
+            </a:schemeClr>
+          </a:lnRef>
+          <a:fillRef idx="1">
+            <a:schemeClr val="accent1"/>
+          </a:fillRef>
+          <a:effectRef idx="0">
+            <a:schemeClr val="accent1"/>
+          </a:effectRef>
+          <a:fontRef idx="minor">
+            <a:schemeClr val="lt1"/>
+          </a:fontRef>
+        </p:style>
+        <p:txBody>
+          <a:bodyPr rtlCol="0" anchor="ctr"/>
+          <a:lstStyle/>
+          <a:p>
+            <a:pPr algn="ctr"/>
+            <a:r>
+              <a:rPr lang="en-US" dirty="0"/>
+              <a:t>read</a:t>
+            </a:r>
+          </a:p>
+        </p:txBody>
+      </p:sp>
+      <p:sp>
+        <p:nvSpPr>
+          <p:cNvPr id="29" name="Rectangle 28">
+            <a:extLst>
+              <a:ext uri="{FF2B5EF4-FFF2-40B4-BE49-F238E27FC236}">
+                <a16:creationId xmlns:a16="http://schemas.microsoft.com/office/drawing/2014/main" id="{94932223-4158-6C47-BCC3-9D54D091F55E}"/>
+              </a:ext>
+            </a:extLst>
+          </p:cNvPr>
+          <p:cNvSpPr/>
+          <p:nvPr/>
+        </p:nvSpPr>
+        <p:spPr>
+          <a:xfrm>
+            <a:off x="7687734" y="10299595"/>
+            <a:ext cx="524931" cy="186716"/>
+          </a:xfrm>
+          <a:prstGeom prst="rect">
+            <a:avLst/>
+          </a:prstGeom>
+          <a:solidFill>
+            <a:schemeClr val="accent6"/>
+          </a:solidFill>
+        </p:spPr>
+        <p:style>
+          <a:lnRef idx="2">
+            <a:schemeClr val="accent1">
+              <a:shade val="50000"/>
+            </a:schemeClr>
+          </a:lnRef>
+          <a:fillRef idx="1">
+            <a:schemeClr val="accent1"/>
+          </a:fillRef>
+          <a:effectRef idx="0">
+            <a:schemeClr val="accent1"/>
+          </a:effectRef>
+          <a:fontRef idx="minor">
+            <a:schemeClr val="lt1"/>
+          </a:fontRef>
+        </p:style>
+        <p:txBody>
+          <a:bodyPr rtlCol="0" anchor="ctr"/>
+          <a:lstStyle/>
+          <a:p>
+            <a:pPr algn="ctr"/>
+            <a:endParaRPr lang="en-US" dirty="0"/>
+          </a:p>
+        </p:txBody>
+      </p:sp>
+      <p:cxnSp>
+        <p:nvCxnSpPr>
+          <p:cNvPr id="30" name="Straight Arrow Connector 29">
+            <a:extLst>
+              <a:ext uri="{FF2B5EF4-FFF2-40B4-BE49-F238E27FC236}">
+                <a16:creationId xmlns:a16="http://schemas.microsoft.com/office/drawing/2014/main" id="{484E7532-A0AC-AE4E-96AE-FB25B7340F9F}"/>
+              </a:ext>
+            </a:extLst>
+          </p:cNvPr>
+          <p:cNvCxnSpPr>
+            <a:cxnSpLocks/>
+            <a:stCxn id="37" idx="2"/>
+          </p:cNvCxnSpPr>
+          <p:nvPr/>
+        </p:nvCxnSpPr>
+        <p:spPr>
+          <a:xfrm>
+            <a:off x="7535333" y="9613972"/>
+            <a:ext cx="268816" cy="859950"/>
+          </a:xfrm>
+          <a:prstGeom prst="straightConnector1">
+            <a:avLst/>
+          </a:prstGeom>
+          <a:ln>
+            <a:solidFill>
+              <a:schemeClr val="accent6"/>
+            </a:solidFill>
+            <a:tailEnd type="triangle"/>
+          </a:ln>
+        </p:spPr>
+        <p:style>
+          <a:lnRef idx="1">
+            <a:schemeClr val="accent1"/>
+          </a:lnRef>
+          <a:fillRef idx="0">
+            <a:schemeClr val="accent1"/>
+          </a:fillRef>
+          <a:effectRef idx="0">
+            <a:schemeClr val="accent1"/>
+          </a:effectRef>
+          <a:fontRef idx="minor">
+            <a:schemeClr val="tx1"/>
+          </a:fontRef>
+        </p:style>
+      </p:cxnSp>
+      <mc:AlternateContent xmlns:mc="http://schemas.openxmlformats.org/markup-compatibility/2006">
+        <mc:Choice xmlns:a14="http://schemas.microsoft.com/office/drawing/2010/main" Requires="a14">
+          <p:sp>
+            <p:nvSpPr>
+              <p:cNvPr id="37" name="TextBox 36">
+                <a:extLst>
+                  <a:ext uri="{FF2B5EF4-FFF2-40B4-BE49-F238E27FC236}">
+                    <a16:creationId xmlns:a16="http://schemas.microsoft.com/office/drawing/2014/main" id="{4BF5323B-F2C6-5142-A0D3-44D3EAC8FC2C}"/>
+                  </a:ext>
+                </a:extLst>
+              </p:cNvPr>
+              <p:cNvSpPr txBox="1"/>
+              <p:nvPr/>
+            </p:nvSpPr>
+            <p:spPr>
+              <a:xfrm>
+                <a:off x="7138525" y="8850943"/>
+                <a:ext cx="793615" cy="763029"/>
+              </a:xfrm>
+              <a:prstGeom prst="rect">
+                <a:avLst/>
+              </a:prstGeom>
+              <a:noFill/>
+            </p:spPr>
+            <p:txBody>
+              <a:bodyPr wrap="none" rtlCol="0">
+                <a:spAutoFit/>
+              </a:bodyPr>
+              <a:lstStyle/>
+              <a:p>
+                <a14:m>
+                  <m:oMathPara xmlns:m="http://schemas.openxmlformats.org/officeDocument/2006/math">
+                    <m:oMathParaPr>
+                      <m:jc m:val="centerGroup"/>
+                    </m:oMathParaPr>
+                    <m:oMath xmlns:m="http://schemas.openxmlformats.org/officeDocument/2006/math">
+                      <m:nary>
+                        <m:naryPr>
+                          <m:chr m:val="∑"/>
+                          <m:subHide m:val="on"/>
+                          <m:supHide m:val="on"/>
+                          <m:ctrlPr>
+                            <a:rPr lang="en-US" i="1" smtClean="0">
+                              <a:latin typeface="Cambria Math" panose="02040503050406030204" pitchFamily="18" charset="0"/>
+                            </a:rPr>
+                          </m:ctrlPr>
+                        </m:naryPr>
+                        <m:sub/>
+                        <m:sup/>
+                        <m:e/>
+                      </m:nary>
+                    </m:oMath>
+                  </m:oMathPara>
+                </a14:m>
+                <a:endParaRPr lang="en-US" dirty="0"/>
+              </a:p>
+            </p:txBody>
+          </p:sp>
+        </mc:Choice>
+        <mc:Fallback>
+          <p:sp>
+            <p:nvSpPr>
+              <p:cNvPr id="37" name="TextBox 36">
+                <a:extLst>
+                  <a:ext uri="{FF2B5EF4-FFF2-40B4-BE49-F238E27FC236}">
+                    <a16:creationId xmlns:a16="http://schemas.microsoft.com/office/drawing/2014/main" id="{4BF5323B-F2C6-5142-A0D3-44D3EAC8FC2C}"/>
+                  </a:ext>
+                </a:extLst>
+              </p:cNvPr>
+              <p:cNvSpPr txBox="1">
+                <a:spLocks noRot="1" noChangeAspect="1" noMove="1" noResize="1" noEditPoints="1" noAdjustHandles="1" noChangeArrowheads="1" noChangeShapeType="1" noTextEdit="1"/>
+              </p:cNvSpPr>
+              <p:nvPr/>
+            </p:nvSpPr>
+            <p:spPr>
+              <a:xfrm>
+                <a:off x="7138525" y="8850943"/>
+                <a:ext cx="793615" cy="763029"/>
+              </a:xfrm>
+              <a:prstGeom prst="rect">
+                <a:avLst/>
+              </a:prstGeom>
+              <a:blipFill>
+                <a:blip r:embed="rId2"/>
+                <a:stretch>
+                  <a:fillRect l="-90625" t="-121311" r="-23438" b="-168852"/>
+                </a:stretch>
+              </a:blipFill>
+            </p:spPr>
+            <p:txBody>
+              <a:bodyPr/>
+              <a:lstStyle/>
+              <a:p>
+                <a:r>
+                  <a:rPr lang="en-US">
+                    <a:noFill/>
+                  </a:rPr>
+                  <a:t> </a:t>
+                </a:r>
+              </a:p>
+            </p:txBody>
+          </p:sp>
+        </mc:Fallback>
+      </mc:AlternateContent>
+      <p:cxnSp>
+        <p:nvCxnSpPr>
+          <p:cNvPr id="41" name="Straight Arrow Connector 40">
+            <a:extLst>
+              <a:ext uri="{FF2B5EF4-FFF2-40B4-BE49-F238E27FC236}">
+                <a16:creationId xmlns:a16="http://schemas.microsoft.com/office/drawing/2014/main" id="{7AD72F30-9F8C-8A42-95DE-16100A8304DA}"/>
+              </a:ext>
+            </a:extLst>
+          </p:cNvPr>
+          <p:cNvCxnSpPr>
+            <a:cxnSpLocks/>
+          </p:cNvCxnSpPr>
+          <p:nvPr/>
+        </p:nvCxnSpPr>
+        <p:spPr>
+          <a:xfrm flipV="1">
+            <a:off x="7626417" y="8578938"/>
+            <a:ext cx="305723" cy="476513"/>
+          </a:xfrm>
+          <a:prstGeom prst="straightConnector1">
+            <a:avLst/>
+          </a:prstGeom>
+          <a:ln>
+            <a:solidFill>
+              <a:schemeClr val="accent6"/>
+            </a:solidFill>
+            <a:tailEnd type="triangle"/>
+          </a:ln>
+        </p:spPr>
+        <p:style>
+          <a:lnRef idx="1">
+            <a:schemeClr val="accent1"/>
+          </a:lnRef>
+          <a:fillRef idx="0">
+            <a:schemeClr val="accent1"/>
+          </a:fillRef>
+          <a:effectRef idx="0">
+            <a:schemeClr val="accent1"/>
+          </a:effectRef>
+          <a:fontRef idx="minor">
+            <a:schemeClr val="tx1"/>
+          </a:fontRef>
+        </p:style>
+      </p:cxnSp>
+    </p:spTree>
+    <p:extLst>
+      <p:ext uri="{BB962C8B-B14F-4D97-AF65-F5344CB8AC3E}">
+        <p14:creationId xmlns:p14="http://schemas.microsoft.com/office/powerpoint/2010/main" val="1719537068"/>
+      </p:ext>
+    </p:extLst>
+  </p:cSld>
+  <p:clrMapOvr>
+    <a:masterClrMapping/>
+  </p:clrMapOvr>
+</p:sld>
+</file>
+
+<file path=ppt/slides/slide3.xml><?xml version="1.0" encoding="utf-8"?>
+<p:sld xmlns:a="http://schemas.openxmlformats.org/drawingml/2006/main" xmlns:r="http://schemas.openxmlformats.org/officeDocument/2006/relationships" xmlns:p="http://schemas.openxmlformats.org/presentationml/2006/main">
+  <p:cSld>
+    <p:spTree>
+      <p:nvGrpSpPr>
+        <p:cNvPr id="1" name=""/>
+        <p:cNvGrpSpPr/>
+        <p:nvPr/>
+      </p:nvGrpSpPr>
+      <p:grpSpPr>
+        <a:xfrm>
+          <a:off x="0" y="0"/>
+          <a:ext cx="0" cy="0"/>
+          <a:chOff x="0" y="0"/>
+          <a:chExt cx="0" cy="0"/>
+        </a:xfrm>
+      </p:grpSpPr>
+      <p:sp>
+        <p:nvSpPr>
+          <p:cNvPr id="2" name="Title 1">
+            <a:extLst>
+              <a:ext uri="{FF2B5EF4-FFF2-40B4-BE49-F238E27FC236}">
+                <a16:creationId xmlns:a16="http://schemas.microsoft.com/office/drawing/2014/main" id="{4D6714D5-2F29-1240-91C8-6698F69E005C}"/>
+              </a:ext>
+            </a:extLst>
+          </p:cNvPr>
+          <p:cNvSpPr>
+            <a:spLocks noGrp="1"/>
+          </p:cNvSpPr>
+          <p:nvPr>
+            <p:ph type="title"/>
+          </p:nvPr>
+        </p:nvSpPr>
+        <p:spPr>
+          <a:xfrm>
+            <a:off x="-1" y="139908"/>
+            <a:ext cx="2163737" cy="2750797"/>
+          </a:xfrm>
+        </p:spPr>
+        <p:txBody>
+          <a:bodyPr>
+            <a:noAutofit/>
+          </a:bodyPr>
+          <a:lstStyle/>
+          <a:p>
+            <a:r>
+              <a:rPr lang="en-US" sz="1350" dirty="0"/>
+              <a:t>More </a:t>
+            </a:r>
+            <a:r>
+              <a:rPr lang="en-US" sz="1350" b="1" dirty="0"/>
+              <a:t>fragmentation</a:t>
+            </a:r>
+            <a:r>
+              <a:rPr lang="en-US" sz="1350" dirty="0"/>
+              <a:t> damage can be observed as curve falling at the extreme on the </a:t>
+            </a:r>
+            <a:r>
+              <a:rPr lang="en-US" sz="1350" b="1" dirty="0"/>
+              <a:t>right</a:t>
+            </a:r>
+            <a:r>
+              <a:rPr lang="en-US" sz="1350" dirty="0"/>
+              <a:t> due to more adapter </a:t>
+            </a:r>
+            <a:r>
+              <a:rPr lang="en-US" sz="1350" b="1" dirty="0"/>
+              <a:t>trimming</a:t>
+            </a:r>
+            <a:r>
+              <a:rPr lang="en-US" sz="1350" dirty="0"/>
+              <a:t>. </a:t>
+            </a:r>
+            <a:br>
+              <a:rPr lang="en-US" sz="1350" dirty="0"/>
+            </a:br>
+            <a:br>
+              <a:rPr lang="en-US" sz="1350" dirty="0"/>
+            </a:br>
+            <a:r>
+              <a:rPr lang="en-US" sz="1350" dirty="0"/>
+              <a:t>At </a:t>
+            </a:r>
+            <a:r>
+              <a:rPr lang="en-US" sz="1350" b="1" dirty="0" err="1"/>
+              <a:t>softclips</a:t>
+            </a:r>
+            <a:r>
+              <a:rPr lang="en-US" sz="1350" dirty="0"/>
+              <a:t>, using the default, we have no observation of bases in these positions. This contributes to </a:t>
+            </a:r>
+            <a:r>
+              <a:rPr lang="en-US" sz="1350" b="1" dirty="0"/>
+              <a:t>right and left</a:t>
+            </a:r>
+            <a:r>
+              <a:rPr lang="en-US" sz="1350" dirty="0"/>
+              <a:t>.</a:t>
+            </a:r>
+            <a:br>
+              <a:rPr lang="en-US" sz="1350" dirty="0"/>
+            </a:br>
+            <a:br>
+              <a:rPr lang="en-US" sz="1350" dirty="0"/>
+            </a:br>
+            <a:endParaRPr lang="en-US" sz="1350" dirty="0"/>
+          </a:p>
+        </p:txBody>
+      </p:sp>
+      <p:sp>
+        <p:nvSpPr>
+          <p:cNvPr id="11" name="TextBox 10">
+            <a:extLst>
+              <a:ext uri="{FF2B5EF4-FFF2-40B4-BE49-F238E27FC236}">
+                <a16:creationId xmlns:a16="http://schemas.microsoft.com/office/drawing/2014/main" id="{EDDE79AB-07BC-3D45-BA8E-39F0A00DAFB4}"/>
+              </a:ext>
+            </a:extLst>
+          </p:cNvPr>
+          <p:cNvSpPr txBox="1"/>
+          <p:nvPr/>
+        </p:nvSpPr>
+        <p:spPr>
+          <a:xfrm>
+            <a:off x="0" y="2890705"/>
+            <a:ext cx="2163737" cy="653256"/>
+          </a:xfrm>
+          <a:prstGeom prst="rect">
+            <a:avLst/>
+          </a:prstGeom>
+          <a:noFill/>
+        </p:spPr>
+        <p:txBody>
+          <a:bodyPr wrap="square" rtlCol="0">
+            <a:spAutoFit/>
+          </a:bodyPr>
+          <a:lstStyle/>
+          <a:p>
+            <a:r>
+              <a:rPr lang="en-US" sz="1215" dirty="0">
+                <a:highlight>
+                  <a:srgbClr val="FFFF00"/>
+                </a:highlight>
+              </a:rPr>
+              <a:t>BTW: There is a “T” peak @position 9 and a “G” @position 2…</a:t>
+            </a:r>
+          </a:p>
+        </p:txBody>
+      </p:sp>
+      <p:pic>
+        <p:nvPicPr>
+          <p:cNvPr id="3" name="Picture 2">
+            <a:extLst>
+              <a:ext uri="{FF2B5EF4-FFF2-40B4-BE49-F238E27FC236}">
+                <a16:creationId xmlns:a16="http://schemas.microsoft.com/office/drawing/2014/main" id="{DAE86B8A-D3F6-FE4C-A619-EBAB006DCFF3}"/>
+              </a:ext>
+            </a:extLst>
+          </p:cNvPr>
+          <p:cNvPicPr>
+            <a:picLocks noChangeAspect="1"/>
+          </p:cNvPicPr>
+          <p:nvPr/>
+        </p:nvPicPr>
+        <p:blipFill>
+          <a:blip r:embed="rId2"/>
+          <a:stretch>
+            <a:fillRect/>
+          </a:stretch>
+        </p:blipFill>
+        <p:spPr>
+          <a:xfrm>
+            <a:off x="0" y="3169125"/>
+            <a:ext cx="8229600" cy="5548949"/>
+          </a:xfrm>
+          <a:prstGeom prst="rect">
+            <a:avLst/>
+          </a:prstGeom>
+        </p:spPr>
+      </p:pic>
+    </p:spTree>
+    <p:extLst>
+      <p:ext uri="{BB962C8B-B14F-4D97-AF65-F5344CB8AC3E}">
+        <p14:creationId xmlns:p14="http://schemas.microsoft.com/office/powerpoint/2010/main" val="1566155094"/>
+      </p:ext>
+    </p:extLst>
+  </p:cSld>
+  <p:clrMapOvr>
+    <a:masterClrMapping/>
+  </p:clrMapOvr>
+</p:sld>
+</file>
+
+<file path=ppt/slides/slide4.xml><?xml version="1.0" encoding="utf-8"?>
+<p:sld xmlns:a="http://schemas.openxmlformats.org/drawingml/2006/main" xmlns:r="http://schemas.openxmlformats.org/officeDocument/2006/relationships" xmlns:p="http://schemas.openxmlformats.org/presentationml/2006/main">
+  <p:cSld>
+    <p:spTree>
+      <p:nvGrpSpPr>
+        <p:cNvPr id="1" name=""/>
+        <p:cNvGrpSpPr/>
+        <p:nvPr/>
+      </p:nvGrpSpPr>
+      <p:grpSpPr>
+        <a:xfrm>
+          <a:off x="0" y="0"/>
+          <a:ext cx="0" cy="0"/>
+          <a:chOff x="0" y="0"/>
+          <a:chExt cx="0" cy="0"/>
+        </a:xfrm>
+      </p:grpSpPr>
+    </p:spTree>
+    <p:extLst>
+      <p:ext uri="{BB962C8B-B14F-4D97-AF65-F5344CB8AC3E}">
+        <p14:creationId xmlns:p14="http://schemas.microsoft.com/office/powerpoint/2010/main" val="2119141324"/>
+      </p:ext>
+    </p:extLst>
+  </p:cSld>
+  <p:clrMapOvr>
+    <a:masterClrMapping/>
+  </p:clrMapOvr>
+</p:sld>
+</file>
+
+<file path=ppt/slides/slide5.xml><?xml version="1.0" encoding="utf-8"?>
 <p:sld xmlns:a="http://schemas.openxmlformats.org/drawingml/2006/main" xmlns:r="http://schemas.openxmlformats.org/officeDocument/2006/relationships" xmlns:p="http://schemas.openxmlformats.org/presentationml/2006/main" show="0">
   <p:cSld>
     <p:spTree>
@@ -20097,7 +21379,7 @@
 </p:sld>
 </file>
 
-<file path=ppt/slides/slide3.xml><?xml version="1.0" encoding="utf-8"?>
+<file path=ppt/slides/slide6.xml><?xml version="1.0" encoding="utf-8"?>
 <p:sld xmlns:a="http://schemas.openxmlformats.org/drawingml/2006/main" xmlns:r="http://schemas.openxmlformats.org/officeDocument/2006/relationships" xmlns:p="http://schemas.openxmlformats.org/presentationml/2006/main" show="0">
   <p:cSld>
     <p:spTree>

</xml_diff>